<commit_message>
upated code and removed thursday excel
</commit_message>
<xml_diff>
--- a/Final presentation.pptx
+++ b/Final presentation.pptx
@@ -108,6 +108,11 @@
       </a:defRPr>
     </a:lvl9pPr>
   </p:defaultTextStyle>
+  <p:extLst>
+    <p:ext uri="{EFAFB233-063F-42B5-8137-9DF3F51BA10A}">
+      <p15:sldGuideLst xmlns:p15="http://schemas.microsoft.com/office/powerpoint/2012/main"/>
+    </p:ext>
+  </p:extLst>
 </p:presentation>
 </file>
 
@@ -193,7 +198,7 @@
           <a:p>
             <a:fld id="{B945E58A-8C4B-C043-A17E-8F22EDF38B55}" type="datetimeFigureOut">
               <a:rPr lang="en-US" smtClean="0"/>
-              <a:t>4/18/19</a:t>
+              <a:t>4/19/19</a:t>
             </a:fld>
             <a:endParaRPr lang="en-US"/>
           </a:p>
@@ -1183,7 +1188,7 @@
           <a:p>
             <a:fld id="{94CA642D-133E-0148-9328-1A76A42B512D}" type="datetimeFigureOut">
               <a:rPr lang="en-US" smtClean="0"/>
-              <a:t>4/18/19</a:t>
+              <a:t>4/19/19</a:t>
             </a:fld>
             <a:endParaRPr lang="en-US"/>
           </a:p>
@@ -1429,7 +1434,7 @@
           <a:p>
             <a:fld id="{94CA642D-133E-0148-9328-1A76A42B512D}" type="datetimeFigureOut">
               <a:rPr lang="en-US" smtClean="0"/>
-              <a:t>4/18/19</a:t>
+              <a:t>4/19/19</a:t>
             </a:fld>
             <a:endParaRPr lang="en-US"/>
           </a:p>
@@ -1738,7 +1743,7 @@
           <a:p>
             <a:fld id="{94CA642D-133E-0148-9328-1A76A42B512D}" type="datetimeFigureOut">
               <a:rPr lang="en-US" smtClean="0"/>
-              <a:t>4/18/19</a:t>
+              <a:t>4/19/19</a:t>
             </a:fld>
             <a:endParaRPr lang="en-US"/>
           </a:p>
@@ -2074,7 +2079,7 @@
           <a:p>
             <a:fld id="{94CA642D-133E-0148-9328-1A76A42B512D}" type="datetimeFigureOut">
               <a:rPr lang="en-US" smtClean="0"/>
-              <a:t>4/18/19</a:t>
+              <a:t>4/19/19</a:t>
             </a:fld>
             <a:endParaRPr lang="en-US"/>
           </a:p>
@@ -2383,7 +2388,7 @@
           <a:p>
             <a:fld id="{94CA642D-133E-0148-9328-1A76A42B512D}" type="datetimeFigureOut">
               <a:rPr lang="en-US" smtClean="0"/>
-              <a:t>4/18/19</a:t>
+              <a:t>4/19/19</a:t>
             </a:fld>
             <a:endParaRPr lang="en-US"/>
           </a:p>
@@ -2771,7 +2776,7 @@
           <a:p>
             <a:fld id="{94CA642D-133E-0148-9328-1A76A42B512D}" type="datetimeFigureOut">
               <a:rPr lang="en-US" smtClean="0"/>
-              <a:t>4/18/19</a:t>
+              <a:t>4/19/19</a:t>
             </a:fld>
             <a:endParaRPr lang="en-US"/>
           </a:p>
@@ -2936,7 +2941,7 @@
           <a:p>
             <a:fld id="{94CA642D-133E-0148-9328-1A76A42B512D}" type="datetimeFigureOut">
               <a:rPr lang="en-US" smtClean="0"/>
-              <a:t>4/18/19</a:t>
+              <a:t>4/19/19</a:t>
             </a:fld>
             <a:endParaRPr lang="en-US"/>
           </a:p>
@@ -3111,7 +3116,7 @@
           <a:p>
             <a:fld id="{94CA642D-133E-0148-9328-1A76A42B512D}" type="datetimeFigureOut">
               <a:rPr lang="en-US" smtClean="0"/>
-              <a:t>4/18/19</a:t>
+              <a:t>4/19/19</a:t>
             </a:fld>
             <a:endParaRPr lang="en-US"/>
           </a:p>
@@ -3282,7 +3287,7 @@
           <a:p>
             <a:fld id="{94CA642D-133E-0148-9328-1A76A42B512D}" type="datetimeFigureOut">
               <a:rPr lang="en-US" smtClean="0"/>
-              <a:t>4/18/19</a:t>
+              <a:t>4/19/19</a:t>
             </a:fld>
             <a:endParaRPr lang="en-US"/>
           </a:p>
@@ -3524,7 +3529,7 @@
           <a:p>
             <a:fld id="{94CA642D-133E-0148-9328-1A76A42B512D}" type="datetimeFigureOut">
               <a:rPr lang="en-US" smtClean="0"/>
-              <a:t>4/18/19</a:t>
+              <a:t>4/19/19</a:t>
             </a:fld>
             <a:endParaRPr lang="en-US"/>
           </a:p>
@@ -3751,7 +3756,7 @@
           <a:p>
             <a:fld id="{94CA642D-133E-0148-9328-1A76A42B512D}" type="datetimeFigureOut">
               <a:rPr lang="en-US" smtClean="0"/>
-              <a:t>4/18/19</a:t>
+              <a:t>4/19/19</a:t>
             </a:fld>
             <a:endParaRPr lang="en-US"/>
           </a:p>
@@ -4120,7 +4125,7 @@
           <a:p>
             <a:fld id="{94CA642D-133E-0148-9328-1A76A42B512D}" type="datetimeFigureOut">
               <a:rPr lang="en-US" smtClean="0"/>
-              <a:t>4/18/19</a:t>
+              <a:t>4/19/19</a:t>
             </a:fld>
             <a:endParaRPr lang="en-US"/>
           </a:p>
@@ -4238,7 +4243,7 @@
           <a:p>
             <a:fld id="{94CA642D-133E-0148-9328-1A76A42B512D}" type="datetimeFigureOut">
               <a:rPr lang="en-US" smtClean="0"/>
-              <a:t>4/18/19</a:t>
+              <a:t>4/19/19</a:t>
             </a:fld>
             <a:endParaRPr lang="en-US"/>
           </a:p>
@@ -4328,7 +4333,7 @@
           <a:p>
             <a:fld id="{94CA642D-133E-0148-9328-1A76A42B512D}" type="datetimeFigureOut">
               <a:rPr lang="en-US" smtClean="0"/>
-              <a:t>4/18/19</a:t>
+              <a:t>4/19/19</a:t>
             </a:fld>
             <a:endParaRPr lang="en-US"/>
           </a:p>
@@ -4578,7 +4583,7 @@
           <a:p>
             <a:fld id="{94CA642D-133E-0148-9328-1A76A42B512D}" type="datetimeFigureOut">
               <a:rPr lang="en-US" smtClean="0"/>
-              <a:t>4/18/19</a:t>
+              <a:t>4/19/19</a:t>
             </a:fld>
             <a:endParaRPr lang="en-US"/>
           </a:p>
@@ -4836,7 +4841,7 @@
           <a:p>
             <a:fld id="{94CA642D-133E-0148-9328-1A76A42B512D}" type="datetimeFigureOut">
               <a:rPr lang="en-US" smtClean="0"/>
-              <a:t>4/18/19</a:t>
+              <a:t>4/19/19</a:t>
             </a:fld>
             <a:endParaRPr lang="en-US"/>
           </a:p>
@@ -5574,7 +5579,7 @@
           <a:p>
             <a:fld id="{94CA642D-133E-0148-9328-1A76A42B512D}" type="datetimeFigureOut">
               <a:rPr lang="en-US" smtClean="0"/>
-              <a:t>4/18/19</a:t>
+              <a:t>4/19/19</a:t>
             </a:fld>
             <a:endParaRPr lang="en-US"/>
           </a:p>
@@ -6187,10 +6192,10 @@
           <p:cNvPr id="8" name="Group 7">
             <a:extLst>
               <a:ext uri="{FF2B5EF4-FFF2-40B4-BE49-F238E27FC236}">
-                <a16:creationId xmlns:a16="http://schemas.microsoft.com/office/drawing/2014/main" xmlns="" id="{09EA7EA7-74F5-4EE2-8E3D-1A10308259D7}"/>
+                <a16:creationId xmlns="" xmlns:a16="http://schemas.microsoft.com/office/drawing/2014/main" id="{09EA7EA7-74F5-4EE2-8E3D-1A10308259D7}"/>
               </a:ext>
               <a:ext uri="{C183D7F6-B498-43B3-948B-1728B52AA6E4}">
-                <adec:decorative xmlns:adec="http://schemas.microsoft.com/office/drawing/2017/decorative" xmlns="" val="1"/>
+                <adec:decorative xmlns="" xmlns:adec="http://schemas.microsoft.com/office/drawing/2017/decorative" val="1"/>
               </a:ext>
             </a:extLst>
           </p:cNvPr>
@@ -6218,10 +6223,10 @@
             <p:cNvPr id="9" name="Straight Connector 8">
               <a:extLst>
                 <a:ext uri="{FF2B5EF4-FFF2-40B4-BE49-F238E27FC236}">
-                  <a16:creationId xmlns:a16="http://schemas.microsoft.com/office/drawing/2014/main" xmlns="" id="{A5CE79B5-7EE4-424D-AD14-5DEFB61B85C8}"/>
+                  <a16:creationId xmlns="" xmlns:a16="http://schemas.microsoft.com/office/drawing/2014/main" id="{A5CE79B5-7EE4-424D-AD14-5DEFB61B85C8}"/>
                 </a:ext>
                 <a:ext uri="{C183D7F6-B498-43B3-948B-1728B52AA6E4}">
-                  <adec:decorative xmlns:adec="http://schemas.microsoft.com/office/drawing/2017/decorative" xmlns="" val="1"/>
+                  <adec:decorative xmlns="" xmlns:adec="http://schemas.microsoft.com/office/drawing/2017/decorative" val="1"/>
                 </a:ext>
               </a:extLst>
             </p:cNvPr>
@@ -6270,10 +6275,10 @@
             <p:cNvPr id="10" name="Straight Connector 9">
               <a:extLst>
                 <a:ext uri="{FF2B5EF4-FFF2-40B4-BE49-F238E27FC236}">
-                  <a16:creationId xmlns:a16="http://schemas.microsoft.com/office/drawing/2014/main" xmlns="" id="{696C926F-F999-44BA-8D86-9EAB51D65010}"/>
+                  <a16:creationId xmlns="" xmlns:a16="http://schemas.microsoft.com/office/drawing/2014/main" id="{696C926F-F999-44BA-8D86-9EAB51D65010}"/>
                 </a:ext>
                 <a:ext uri="{C183D7F6-B498-43B3-948B-1728B52AA6E4}">
-                  <adec:decorative xmlns:adec="http://schemas.microsoft.com/office/drawing/2017/decorative" xmlns="" val="1"/>
+                  <adec:decorative xmlns="" xmlns:adec="http://schemas.microsoft.com/office/drawing/2017/decorative" val="1"/>
                 </a:ext>
               </a:extLst>
             </p:cNvPr>
@@ -6322,10 +6327,10 @@
             <p:cNvPr id="11" name="Rectangle 23">
               <a:extLst>
                 <a:ext uri="{FF2B5EF4-FFF2-40B4-BE49-F238E27FC236}">
-                  <a16:creationId xmlns:a16="http://schemas.microsoft.com/office/drawing/2014/main" xmlns="" id="{248745E7-0AF0-48F9-8E58-2673FC5F4FDE}"/>
+                  <a16:creationId xmlns="" xmlns:a16="http://schemas.microsoft.com/office/drawing/2014/main" id="{248745E7-0AF0-48F9-8E58-2673FC5F4FDE}"/>
                 </a:ext>
                 <a:ext uri="{C183D7F6-B498-43B3-948B-1728B52AA6E4}">
-                  <adec:decorative xmlns:adec="http://schemas.microsoft.com/office/drawing/2017/decorative" xmlns="" val="1"/>
+                  <adec:decorative xmlns="" xmlns:adec="http://schemas.microsoft.com/office/drawing/2017/decorative" val="1"/>
                 </a:ext>
               </a:extLst>
             </p:cNvPr>
@@ -6400,10 +6405,10 @@
             <p:cNvPr id="12" name="Rectangle 25">
               <a:extLst>
                 <a:ext uri="{FF2B5EF4-FFF2-40B4-BE49-F238E27FC236}">
-                  <a16:creationId xmlns:a16="http://schemas.microsoft.com/office/drawing/2014/main" xmlns="" id="{9715E81A-D2E0-4431-9370-4E4A9ECA7F9C}"/>
+                  <a16:creationId xmlns="" xmlns:a16="http://schemas.microsoft.com/office/drawing/2014/main" id="{9715E81A-D2E0-4431-9370-4E4A9ECA7F9C}"/>
                 </a:ext>
                 <a:ext uri="{C183D7F6-B498-43B3-948B-1728B52AA6E4}">
-                  <adec:decorative xmlns:adec="http://schemas.microsoft.com/office/drawing/2017/decorative" xmlns="" val="1"/>
+                  <adec:decorative xmlns="" xmlns:adec="http://schemas.microsoft.com/office/drawing/2017/decorative" val="1"/>
                 </a:ext>
               </a:extLst>
             </p:cNvPr>
@@ -6478,10 +6483,10 @@
             <p:cNvPr id="13" name="Isosceles Triangle 12">
               <a:extLst>
                 <a:ext uri="{FF2B5EF4-FFF2-40B4-BE49-F238E27FC236}">
-                  <a16:creationId xmlns:a16="http://schemas.microsoft.com/office/drawing/2014/main" xmlns="" id="{CEDB37A9-282D-4DDB-85AD-B2090A82531F}"/>
+                  <a16:creationId xmlns="" xmlns:a16="http://schemas.microsoft.com/office/drawing/2014/main" id="{CEDB37A9-282D-4DDB-85AD-B2090A82531F}"/>
                 </a:ext>
                 <a:ext uri="{C183D7F6-B498-43B3-948B-1728B52AA6E4}">
-                  <adec:decorative xmlns:adec="http://schemas.microsoft.com/office/drawing/2017/decorative" xmlns="" val="1"/>
+                  <adec:decorative xmlns="" xmlns:adec="http://schemas.microsoft.com/office/drawing/2017/decorative" val="1"/>
                 </a:ext>
               </a:extLst>
             </p:cNvPr>
@@ -6534,10 +6539,10 @@
             <p:cNvPr id="14" name="Rectangle 27">
               <a:extLst>
                 <a:ext uri="{FF2B5EF4-FFF2-40B4-BE49-F238E27FC236}">
-                  <a16:creationId xmlns:a16="http://schemas.microsoft.com/office/drawing/2014/main" xmlns="" id="{533D5933-7F91-4F5E-BC31-42FD0E2D8DEF}"/>
+                  <a16:creationId xmlns="" xmlns:a16="http://schemas.microsoft.com/office/drawing/2014/main" id="{533D5933-7F91-4F5E-BC31-42FD0E2D8DEF}"/>
                 </a:ext>
                 <a:ext uri="{C183D7F6-B498-43B3-948B-1728B52AA6E4}">
-                  <adec:decorative xmlns:adec="http://schemas.microsoft.com/office/drawing/2017/decorative" xmlns="" val="1"/>
+                  <adec:decorative xmlns="" xmlns:adec="http://schemas.microsoft.com/office/drawing/2017/decorative" val="1"/>
                 </a:ext>
               </a:extLst>
             </p:cNvPr>
@@ -6613,10 +6618,10 @@
             <p:cNvPr id="15" name="Rectangle 28">
               <a:extLst>
                 <a:ext uri="{FF2B5EF4-FFF2-40B4-BE49-F238E27FC236}">
-                  <a16:creationId xmlns:a16="http://schemas.microsoft.com/office/drawing/2014/main" xmlns="" id="{37ADDF68-C9BE-46EA-83DE-2C07DD83960F}"/>
+                  <a16:creationId xmlns="" xmlns:a16="http://schemas.microsoft.com/office/drawing/2014/main" id="{37ADDF68-C9BE-46EA-83DE-2C07DD83960F}"/>
                 </a:ext>
                 <a:ext uri="{C183D7F6-B498-43B3-948B-1728B52AA6E4}">
-                  <adec:decorative xmlns:adec="http://schemas.microsoft.com/office/drawing/2017/decorative" xmlns="" val="1"/>
+                  <adec:decorative xmlns="" xmlns:adec="http://schemas.microsoft.com/office/drawing/2017/decorative" val="1"/>
                 </a:ext>
               </a:extLst>
             </p:cNvPr>
@@ -6693,10 +6698,10 @@
             <p:cNvPr id="16" name="Rectangle 29">
               <a:extLst>
                 <a:ext uri="{FF2B5EF4-FFF2-40B4-BE49-F238E27FC236}">
-                  <a16:creationId xmlns:a16="http://schemas.microsoft.com/office/drawing/2014/main" xmlns="" id="{10D67396-BABD-48A8-A892-CCB5095FA427}"/>
+                  <a16:creationId xmlns="" xmlns:a16="http://schemas.microsoft.com/office/drawing/2014/main" id="{10D67396-BABD-48A8-A892-CCB5095FA427}"/>
                 </a:ext>
                 <a:ext uri="{C183D7F6-B498-43B3-948B-1728B52AA6E4}">
-                  <adec:decorative xmlns:adec="http://schemas.microsoft.com/office/drawing/2017/decorative" xmlns="" val="1"/>
+                  <adec:decorative xmlns="" xmlns:adec="http://schemas.microsoft.com/office/drawing/2017/decorative" val="1"/>
                 </a:ext>
               </a:extLst>
             </p:cNvPr>
@@ -6771,10 +6776,10 @@
             <p:cNvPr id="17" name="Isosceles Triangle 16">
               <a:extLst>
                 <a:ext uri="{FF2B5EF4-FFF2-40B4-BE49-F238E27FC236}">
-                  <a16:creationId xmlns:a16="http://schemas.microsoft.com/office/drawing/2014/main" xmlns="" id="{626DA82A-72C2-4DF6-9CF0-0D1F6B96B529}"/>
+                  <a16:creationId xmlns="" xmlns:a16="http://schemas.microsoft.com/office/drawing/2014/main" id="{626DA82A-72C2-4DF6-9CF0-0D1F6B96B529}"/>
                 </a:ext>
                 <a:ext uri="{C183D7F6-B498-43B3-948B-1728B52AA6E4}">
-                  <adec:decorative xmlns:adec="http://schemas.microsoft.com/office/drawing/2017/decorative" xmlns="" val="1"/>
+                  <adec:decorative xmlns="" xmlns:adec="http://schemas.microsoft.com/office/drawing/2017/decorative" val="1"/>
                 </a:ext>
               </a:extLst>
             </p:cNvPr>
@@ -6827,10 +6832,10 @@
             <p:cNvPr id="18" name="Isosceles Triangle 17">
               <a:extLst>
                 <a:ext uri="{FF2B5EF4-FFF2-40B4-BE49-F238E27FC236}">
-                  <a16:creationId xmlns:a16="http://schemas.microsoft.com/office/drawing/2014/main" xmlns="" id="{8EE6DC63-4380-4BE0-A68A-8F01162BD192}"/>
+                  <a16:creationId xmlns="" xmlns:a16="http://schemas.microsoft.com/office/drawing/2014/main" id="{8EE6DC63-4380-4BE0-A68A-8F01162BD192}"/>
                 </a:ext>
                 <a:ext uri="{C183D7F6-B498-43B3-948B-1728B52AA6E4}">
-                  <adec:decorative xmlns:adec="http://schemas.microsoft.com/office/drawing/2017/decorative" xmlns="" val="1"/>
+                  <adec:decorative xmlns="" xmlns:adec="http://schemas.microsoft.com/office/drawing/2017/decorative" val="1"/>
                 </a:ext>
               </a:extLst>
             </p:cNvPr>
@@ -6884,10 +6889,10 @@
           <p:cNvPr id="20" name="Straight Connector 19">
             <a:extLst>
               <a:ext uri="{FF2B5EF4-FFF2-40B4-BE49-F238E27FC236}">
-                <a16:creationId xmlns:a16="http://schemas.microsoft.com/office/drawing/2014/main" xmlns="" id="{0B5F7E3B-C5F1-40E0-A491-558BAFBC1127}"/>
+                <a16:creationId xmlns="" xmlns:a16="http://schemas.microsoft.com/office/drawing/2014/main" id="{0B5F7E3B-C5F1-40E0-A491-558BAFBC1127}"/>
               </a:ext>
               <a:ext uri="{C183D7F6-B498-43B3-948B-1728B52AA6E4}">
-                <adec:decorative xmlns:adec="http://schemas.microsoft.com/office/drawing/2017/decorative" xmlns="" val="1"/>
+                <adec:decorative xmlns="" xmlns:adec="http://schemas.microsoft.com/office/drawing/2017/decorative" val="1"/>
               </a:ext>
             </a:extLst>
           </p:cNvPr>

</xml_diff>

<commit_message>
upated code and ppt
</commit_message>
<xml_diff>
--- a/Final presentation.pptx
+++ b/Final presentation.pptx
@@ -5,7 +5,7 @@
     <p:sldMasterId id="2147483867" r:id="rId1"/>
   </p:sldMasterIdLst>
   <p:notesMasterIdLst>
-    <p:notesMasterId r:id="rId11"/>
+    <p:notesMasterId r:id="rId13"/>
   </p:notesMasterIdLst>
   <p:sldIdLst>
     <p:sldId id="256" r:id="rId2"/>
@@ -15,8 +15,10 @@
     <p:sldId id="260" r:id="rId6"/>
     <p:sldId id="264" r:id="rId7"/>
     <p:sldId id="261" r:id="rId8"/>
-    <p:sldId id="262" r:id="rId9"/>
-    <p:sldId id="263" r:id="rId10"/>
+    <p:sldId id="265" r:id="rId9"/>
+    <p:sldId id="262" r:id="rId10"/>
+    <p:sldId id="266" r:id="rId11"/>
+    <p:sldId id="263" r:id="rId12"/>
   </p:sldIdLst>
   <p:sldSz cx="12192000" cy="6858000"/>
   <p:notesSz cx="6858000" cy="9144000"/>
@@ -832,6 +834,225 @@
     <p:extLst>
       <p:ext uri="{BB962C8B-B14F-4D97-AF65-F5344CB8AC3E}">
         <p14:creationId xmlns:p14="http://schemas.microsoft.com/office/powerpoint/2010/main" val="101929267"/>
+      </p:ext>
+    </p:extLst>
+  </p:cSld>
+  <p:clrMapOvr>
+    <a:masterClrMapping/>
+  </p:clrMapOvr>
+</p:notes>
+</file>
+
+<file path=ppt/notesSlides/notesSlide4.xml><?xml version="1.0" encoding="utf-8"?>
+<p:notes xmlns:a="http://schemas.openxmlformats.org/drawingml/2006/main" xmlns:r="http://schemas.openxmlformats.org/officeDocument/2006/relationships" xmlns:p="http://schemas.openxmlformats.org/presentationml/2006/main">
+  <p:cSld>
+    <p:spTree>
+      <p:nvGrpSpPr>
+        <p:cNvPr id="1" name=""/>
+        <p:cNvGrpSpPr/>
+        <p:nvPr/>
+      </p:nvGrpSpPr>
+      <p:grpSpPr>
+        <a:xfrm>
+          <a:off x="0" y="0"/>
+          <a:ext cx="0" cy="0"/>
+          <a:chOff x="0" y="0"/>
+          <a:chExt cx="0" cy="0"/>
+        </a:xfrm>
+      </p:grpSpPr>
+      <p:sp>
+        <p:nvSpPr>
+          <p:cNvPr id="2" name="Slide Image Placeholder 1"/>
+          <p:cNvSpPr>
+            <a:spLocks noGrp="1" noRot="1" noChangeAspect="1"/>
+          </p:cNvSpPr>
+          <p:nvPr>
+            <p:ph type="sldImg"/>
+          </p:nvPr>
+        </p:nvSpPr>
+        <p:spPr/>
+      </p:sp>
+      <p:sp>
+        <p:nvSpPr>
+          <p:cNvPr id="3" name="Notes Placeholder 2"/>
+          <p:cNvSpPr>
+            <a:spLocks noGrp="1"/>
+          </p:cNvSpPr>
+          <p:nvPr>
+            <p:ph type="body" idx="1"/>
+          </p:nvPr>
+        </p:nvSpPr>
+        <p:spPr/>
+        <p:txBody>
+          <a:bodyPr/>
+          <a:lstStyle/>
+          <a:p>
+            <a:r>
+              <a:rPr lang="en-US" sz="1200" kern="1200" dirty="0" smtClean="0">
+                <a:solidFill>
+                  <a:schemeClr val="tx1"/>
+                </a:solidFill>
+                <a:effectLst/>
+                <a:latin typeface="+mn-lt"/>
+                <a:ea typeface="+mn-ea"/>
+                <a:cs typeface="+mn-cs"/>
+              </a:rPr>
+              <a:t>looks like highest rated classes are actually cheaper. Further analysis- show that the highly rated classes have very few reviews and so not reliable - show fancy graph. </a:t>
+            </a:r>
+            <a:endParaRPr lang="en-US" sz="1200" kern="1200" dirty="0">
+              <a:solidFill>
+                <a:schemeClr val="tx1"/>
+              </a:solidFill>
+              <a:effectLst/>
+              <a:latin typeface="+mn-lt"/>
+              <a:ea typeface="+mn-ea"/>
+              <a:cs typeface="+mn-cs"/>
+            </a:endParaRPr>
+          </a:p>
+        </p:txBody>
+      </p:sp>
+      <p:sp>
+        <p:nvSpPr>
+          <p:cNvPr id="4" name="Slide Number Placeholder 3"/>
+          <p:cNvSpPr>
+            <a:spLocks noGrp="1"/>
+          </p:cNvSpPr>
+          <p:nvPr>
+            <p:ph type="sldNum" sz="quarter" idx="10"/>
+          </p:nvPr>
+        </p:nvSpPr>
+        <p:spPr/>
+        <p:txBody>
+          <a:bodyPr/>
+          <a:lstStyle/>
+          <a:p>
+            <a:fld id="{6FE937B6-8F75-1B4F-9712-E0027EB908E2}" type="slidenum">
+              <a:rPr lang="en-US" smtClean="0"/>
+              <a:t>9</a:t>
+            </a:fld>
+            <a:endParaRPr lang="en-US"/>
+          </a:p>
+        </p:txBody>
+      </p:sp>
+    </p:spTree>
+    <p:extLst>
+      <p:ext uri="{BB962C8B-B14F-4D97-AF65-F5344CB8AC3E}">
+        <p14:creationId xmlns:p14="http://schemas.microsoft.com/office/powerpoint/2010/main" val="1507977295"/>
+      </p:ext>
+    </p:extLst>
+  </p:cSld>
+  <p:clrMapOvr>
+    <a:masterClrMapping/>
+  </p:clrMapOvr>
+</p:notes>
+</file>
+
+<file path=ppt/notesSlides/notesSlide5.xml><?xml version="1.0" encoding="utf-8"?>
+<p:notes xmlns:a="http://schemas.openxmlformats.org/drawingml/2006/main" xmlns:r="http://schemas.openxmlformats.org/officeDocument/2006/relationships" xmlns:p="http://schemas.openxmlformats.org/presentationml/2006/main">
+  <p:cSld>
+    <p:spTree>
+      <p:nvGrpSpPr>
+        <p:cNvPr id="1" name=""/>
+        <p:cNvGrpSpPr/>
+        <p:nvPr/>
+      </p:nvGrpSpPr>
+      <p:grpSpPr>
+        <a:xfrm>
+          <a:off x="0" y="0"/>
+          <a:ext cx="0" cy="0"/>
+          <a:chOff x="0" y="0"/>
+          <a:chExt cx="0" cy="0"/>
+        </a:xfrm>
+      </p:grpSpPr>
+      <p:sp>
+        <p:nvSpPr>
+          <p:cNvPr id="2" name="Slide Image Placeholder 1"/>
+          <p:cNvSpPr>
+            <a:spLocks noGrp="1" noRot="1" noChangeAspect="1"/>
+          </p:cNvSpPr>
+          <p:nvPr>
+            <p:ph type="sldImg"/>
+          </p:nvPr>
+        </p:nvSpPr>
+        <p:spPr/>
+      </p:sp>
+      <p:sp>
+        <p:nvSpPr>
+          <p:cNvPr id="3" name="Notes Placeholder 2"/>
+          <p:cNvSpPr>
+            <a:spLocks noGrp="1"/>
+          </p:cNvSpPr>
+          <p:nvPr>
+            <p:ph type="body" idx="1"/>
+          </p:nvPr>
+        </p:nvSpPr>
+        <p:spPr/>
+        <p:txBody>
+          <a:bodyPr/>
+          <a:lstStyle/>
+          <a:p>
+            <a:pPr marL="0" marR="0" indent="0" algn="l" defTabSz="914400" rtl="0" eaLnBrk="1" fontAlgn="auto" latinLnBrk="0" hangingPunct="1">
+              <a:lnSpc>
+                <a:spcPct val="100000"/>
+              </a:lnSpc>
+              <a:spcBef>
+                <a:spcPts val="0"/>
+              </a:spcBef>
+              <a:spcAft>
+                <a:spcPts val="0"/>
+              </a:spcAft>
+              <a:buClrTx/>
+              <a:buSzTx/>
+              <a:buFontTx/>
+              <a:buNone/>
+              <a:tabLst/>
+              <a:defRPr/>
+            </a:pPr>
+            <a:r>
+              <a:rPr lang="en-US" sz="1200" kern="1200" dirty="0" smtClean="0">
+                <a:solidFill>
+                  <a:schemeClr val="tx1"/>
+                </a:solidFill>
+                <a:effectLst/>
+                <a:latin typeface="+mn-lt"/>
+                <a:ea typeface="+mn-ea"/>
+                <a:cs typeface="+mn-cs"/>
+              </a:rPr>
+              <a:t>Therefore, a better measure of popularity is quite simply the number of reviews. After calculating the correlations between all numeric variables it was clear that the highest correlation was that between price and reviews which can be seen here (fancy plot)</a:t>
+            </a:r>
+          </a:p>
+          <a:p>
+            <a:endParaRPr lang="en-US" dirty="0"/>
+          </a:p>
+        </p:txBody>
+      </p:sp>
+      <p:sp>
+        <p:nvSpPr>
+          <p:cNvPr id="4" name="Slide Number Placeholder 3"/>
+          <p:cNvSpPr>
+            <a:spLocks noGrp="1"/>
+          </p:cNvSpPr>
+          <p:nvPr>
+            <p:ph type="sldNum" sz="quarter" idx="10"/>
+          </p:nvPr>
+        </p:nvSpPr>
+        <p:spPr/>
+        <p:txBody>
+          <a:bodyPr/>
+          <a:lstStyle/>
+          <a:p>
+            <a:fld id="{6FE937B6-8F75-1B4F-9712-E0027EB908E2}" type="slidenum">
+              <a:rPr lang="en-US" smtClean="0"/>
+              <a:t>10</a:t>
+            </a:fld>
+            <a:endParaRPr lang="en-US"/>
+          </a:p>
+        </p:txBody>
+      </p:sp>
+    </p:spTree>
+    <p:extLst>
+      <p:ext uri="{BB962C8B-B14F-4D97-AF65-F5344CB8AC3E}">
+        <p14:creationId xmlns:p14="http://schemas.microsoft.com/office/powerpoint/2010/main" val="2049590396"/>
       </p:ext>
     </p:extLst>
   </p:cSld>
@@ -6840,6 +7061,193 @@
 </p:sld>
 </file>
 
+<file path=ppt/slides/slide10.xml><?xml version="1.0" encoding="utf-8"?>
+<p:sld xmlns:a="http://schemas.openxmlformats.org/drawingml/2006/main" xmlns:r="http://schemas.openxmlformats.org/officeDocument/2006/relationships" xmlns:p="http://schemas.openxmlformats.org/presentationml/2006/main">
+  <p:cSld>
+    <p:spTree>
+      <p:nvGrpSpPr>
+        <p:cNvPr id="1" name=""/>
+        <p:cNvGrpSpPr/>
+        <p:nvPr/>
+      </p:nvGrpSpPr>
+      <p:grpSpPr>
+        <a:xfrm>
+          <a:off x="0" y="0"/>
+          <a:ext cx="0" cy="0"/>
+          <a:chOff x="0" y="0"/>
+          <a:chExt cx="0" cy="0"/>
+        </a:xfrm>
+      </p:grpSpPr>
+      <p:sp>
+        <p:nvSpPr>
+          <p:cNvPr id="2" name="Title 1"/>
+          <p:cNvSpPr>
+            <a:spLocks noGrp="1"/>
+          </p:cNvSpPr>
+          <p:nvPr>
+            <p:ph type="title"/>
+          </p:nvPr>
+        </p:nvSpPr>
+        <p:spPr/>
+        <p:txBody>
+          <a:bodyPr/>
+          <a:lstStyle/>
+          <a:p>
+            <a:r>
+              <a:rPr lang="en-US" dirty="0" smtClean="0"/>
+              <a:t>How much should you spend?</a:t>
+            </a:r>
+            <a:br>
+              <a:rPr lang="en-US" dirty="0" smtClean="0"/>
+            </a:br>
+            <a:endParaRPr lang="en-US" dirty="0"/>
+          </a:p>
+        </p:txBody>
+      </p:sp>
+      <p:pic>
+        <p:nvPicPr>
+          <p:cNvPr id="4" name="Picture 3"/>
+          <p:cNvPicPr>
+            <a:picLocks noChangeAspect="1"/>
+          </p:cNvPicPr>
+          <p:nvPr/>
+        </p:nvPicPr>
+        <p:blipFill>
+          <a:blip r:embed="rId3">
+            <a:clrChange>
+              <a:clrFrom>
+                <a:srgbClr val="FFFFFF"/>
+              </a:clrFrom>
+              <a:clrTo>
+                <a:srgbClr val="FFFFFF">
+                  <a:alpha val="0"/>
+                </a:srgbClr>
+              </a:clrTo>
+            </a:clrChange>
+            <a:extLst>
+              <a:ext uri="{28A0092B-C50C-407E-A947-70E740481C1C}">
+                <a14:useLocalDpi xmlns:a14="http://schemas.microsoft.com/office/drawing/2010/main" val="0"/>
+              </a:ext>
+            </a:extLst>
+          </a:blip>
+          <a:stretch>
+            <a:fillRect/>
+          </a:stretch>
+        </p:blipFill>
+        <p:spPr>
+          <a:xfrm>
+            <a:off x="2270539" y="1685234"/>
+            <a:ext cx="4470400" cy="4521200"/>
+          </a:xfrm>
+          <a:prstGeom prst="rect">
+            <a:avLst/>
+          </a:prstGeom>
+        </p:spPr>
+      </p:pic>
+    </p:spTree>
+    <p:extLst>
+      <p:ext uri="{BB962C8B-B14F-4D97-AF65-F5344CB8AC3E}">
+        <p14:creationId xmlns:p14="http://schemas.microsoft.com/office/powerpoint/2010/main" val="943454679"/>
+      </p:ext>
+    </p:extLst>
+  </p:cSld>
+  <p:clrMapOvr>
+    <a:masterClrMapping/>
+  </p:clrMapOvr>
+</p:sld>
+</file>
+
+<file path=ppt/slides/slide11.xml><?xml version="1.0" encoding="utf-8"?>
+<p:sld xmlns:a="http://schemas.openxmlformats.org/drawingml/2006/main" xmlns:r="http://schemas.openxmlformats.org/officeDocument/2006/relationships" xmlns:p="http://schemas.openxmlformats.org/presentationml/2006/main">
+  <p:cSld>
+    <p:spTree>
+      <p:nvGrpSpPr>
+        <p:cNvPr id="1" name=""/>
+        <p:cNvGrpSpPr/>
+        <p:nvPr/>
+      </p:nvGrpSpPr>
+      <p:grpSpPr>
+        <a:xfrm>
+          <a:off x="0" y="0"/>
+          <a:ext cx="0" cy="0"/>
+          <a:chOff x="0" y="0"/>
+          <a:chExt cx="0" cy="0"/>
+        </a:xfrm>
+      </p:grpSpPr>
+      <p:sp>
+        <p:nvSpPr>
+          <p:cNvPr id="2" name="Title 1"/>
+          <p:cNvSpPr>
+            <a:spLocks noGrp="1"/>
+          </p:cNvSpPr>
+          <p:nvPr>
+            <p:ph type="title"/>
+          </p:nvPr>
+        </p:nvSpPr>
+        <p:spPr/>
+        <p:txBody>
+          <a:bodyPr/>
+          <a:lstStyle/>
+          <a:p>
+            <a:r>
+              <a:rPr lang="en-US" dirty="0" smtClean="0"/>
+              <a:t>Future Investigations</a:t>
+            </a:r>
+            <a:endParaRPr lang="en-US" dirty="0"/>
+          </a:p>
+        </p:txBody>
+      </p:sp>
+      <p:sp>
+        <p:nvSpPr>
+          <p:cNvPr id="3" name="Content Placeholder 2"/>
+          <p:cNvSpPr>
+            <a:spLocks noGrp="1"/>
+          </p:cNvSpPr>
+          <p:nvPr>
+            <p:ph sz="half" idx="1"/>
+          </p:nvPr>
+        </p:nvSpPr>
+        <p:spPr/>
+        <p:txBody>
+          <a:bodyPr/>
+          <a:lstStyle/>
+          <a:p>
+            <a:endParaRPr lang="en-US"/>
+          </a:p>
+        </p:txBody>
+      </p:sp>
+      <p:sp>
+        <p:nvSpPr>
+          <p:cNvPr id="4" name="Content Placeholder 3"/>
+          <p:cNvSpPr>
+            <a:spLocks noGrp="1"/>
+          </p:cNvSpPr>
+          <p:nvPr>
+            <p:ph sz="half" idx="2"/>
+          </p:nvPr>
+        </p:nvSpPr>
+        <p:spPr/>
+        <p:txBody>
+          <a:bodyPr/>
+          <a:lstStyle/>
+          <a:p>
+            <a:endParaRPr lang="en-US"/>
+          </a:p>
+        </p:txBody>
+      </p:sp>
+    </p:spTree>
+    <p:extLst>
+      <p:ext uri="{BB962C8B-B14F-4D97-AF65-F5344CB8AC3E}">
+        <p14:creationId xmlns:p14="http://schemas.microsoft.com/office/powerpoint/2010/main" val="1952043160"/>
+      </p:ext>
+    </p:extLst>
+  </p:cSld>
+  <p:clrMapOvr>
+    <a:masterClrMapping/>
+  </p:clrMapOvr>
+</p:sld>
+</file>
+
 <file path=ppt/slides/slide2.xml><?xml version="1.0" encoding="utf-8"?>
 <p:sld xmlns:a="http://schemas.openxmlformats.org/drawingml/2006/main" xmlns:r="http://schemas.openxmlformats.org/officeDocument/2006/relationships" xmlns:p="http://schemas.openxmlformats.org/presentationml/2006/main">
   <p:cSld>
@@ -12445,6 +12853,126 @@
           </a:p>
         </p:txBody>
       </p:sp>
+      <p:pic>
+        <p:nvPicPr>
+          <p:cNvPr id="8" name="Picture 7"/>
+          <p:cNvPicPr>
+            <a:picLocks noChangeAspect="1"/>
+          </p:cNvPicPr>
+          <p:nvPr/>
+        </p:nvPicPr>
+        <p:blipFill>
+          <a:blip r:embed="rId2">
+            <a:clrChange>
+              <a:clrFrom>
+                <a:srgbClr val="FFFFFF"/>
+              </a:clrFrom>
+              <a:clrTo>
+                <a:srgbClr val="FFFFFF">
+                  <a:alpha val="0"/>
+                </a:srgbClr>
+              </a:clrTo>
+            </a:clrChange>
+            <a:extLst>
+              <a:ext uri="{28A0092B-C50C-407E-A947-70E740481C1C}">
+                <a14:useLocalDpi xmlns:a14="http://schemas.microsoft.com/office/drawing/2010/main" val="0"/>
+              </a:ext>
+            </a:extLst>
+          </a:blip>
+          <a:stretch>
+            <a:fillRect/>
+          </a:stretch>
+        </p:blipFill>
+        <p:spPr>
+          <a:xfrm>
+            <a:off x="1136588" y="2248451"/>
+            <a:ext cx="3556576" cy="2880000"/>
+          </a:xfrm>
+          <a:prstGeom prst="rect">
+            <a:avLst/>
+          </a:prstGeom>
+        </p:spPr>
+      </p:pic>
+      <p:pic>
+        <p:nvPicPr>
+          <p:cNvPr id="9" name="Picture 8"/>
+          <p:cNvPicPr>
+            <a:picLocks noChangeAspect="1"/>
+          </p:cNvPicPr>
+          <p:nvPr/>
+        </p:nvPicPr>
+        <p:blipFill>
+          <a:blip r:embed="rId3">
+            <a:clrChange>
+              <a:clrFrom>
+                <a:srgbClr val="FFFFFF"/>
+              </a:clrFrom>
+              <a:clrTo>
+                <a:srgbClr val="FFFFFF">
+                  <a:alpha val="0"/>
+                </a:srgbClr>
+              </a:clrTo>
+            </a:clrChange>
+            <a:extLst>
+              <a:ext uri="{28A0092B-C50C-407E-A947-70E740481C1C}">
+                <a14:useLocalDpi xmlns:a14="http://schemas.microsoft.com/office/drawing/2010/main" val="0"/>
+              </a:ext>
+            </a:extLst>
+          </a:blip>
+          <a:stretch>
+            <a:fillRect/>
+          </a:stretch>
+        </p:blipFill>
+        <p:spPr>
+          <a:xfrm>
+            <a:off x="4799154" y="2248451"/>
+            <a:ext cx="3730280" cy="2880000"/>
+          </a:xfrm>
+          <a:prstGeom prst="rect">
+            <a:avLst/>
+          </a:prstGeom>
+        </p:spPr>
+      </p:pic>
+      <p:pic>
+        <p:nvPicPr>
+          <p:cNvPr id="10" name="Picture 9"/>
+          <p:cNvPicPr>
+            <a:picLocks noChangeAspect="1"/>
+          </p:cNvPicPr>
+          <p:nvPr/>
+        </p:nvPicPr>
+        <p:blipFill>
+          <a:blip r:embed="rId4">
+            <a:clrChange>
+              <a:clrFrom>
+                <a:srgbClr val="FFFFFF"/>
+              </a:clrFrom>
+              <a:clrTo>
+                <a:srgbClr val="FFFFFF">
+                  <a:alpha val="0"/>
+                </a:srgbClr>
+              </a:clrTo>
+            </a:clrChange>
+            <a:extLst>
+              <a:ext uri="{28A0092B-C50C-407E-A947-70E740481C1C}">
+                <a14:useLocalDpi xmlns:a14="http://schemas.microsoft.com/office/drawing/2010/main" val="0"/>
+              </a:ext>
+            </a:extLst>
+          </a:blip>
+          <a:stretch>
+            <a:fillRect/>
+          </a:stretch>
+        </p:blipFill>
+        <p:spPr>
+          <a:xfrm>
+            <a:off x="8635424" y="2248451"/>
+            <a:ext cx="3556576" cy="2880000"/>
+          </a:xfrm>
+          <a:prstGeom prst="rect">
+            <a:avLst/>
+          </a:prstGeom>
+        </p:spPr>
+      </p:pic>
     </p:spTree>
     <p:extLst>
       <p:ext uri="{BB962C8B-B14F-4D97-AF65-F5344CB8AC3E}">
@@ -12485,64 +13013,148 @@
             <p:ph type="title"/>
           </p:nvPr>
         </p:nvSpPr>
-        <p:spPr/>
+        <p:spPr>
+          <a:xfrm>
+            <a:off x="410885" y="314739"/>
+            <a:ext cx="10018713" cy="1752599"/>
+          </a:xfrm>
+        </p:spPr>
         <p:txBody>
           <a:bodyPr/>
           <a:lstStyle/>
           <a:p>
             <a:r>
               <a:rPr lang="en-US" dirty="0" smtClean="0"/>
-              <a:t>How much should you spend?</a:t>
-            </a:r>
-            <a:br>
-              <a:rPr lang="en-US" dirty="0" smtClean="0"/>
-            </a:br>
+              <a:t>What should you work out?</a:t>
+            </a:r>
             <a:endParaRPr lang="en-US" dirty="0"/>
           </a:p>
         </p:txBody>
       </p:sp>
-      <p:sp>
-        <p:nvSpPr>
-          <p:cNvPr id="3" name="Content Placeholder 2"/>
-          <p:cNvSpPr>
-            <a:spLocks noGrp="1"/>
-          </p:cNvSpPr>
-          <p:nvPr>
-            <p:ph sz="half" idx="1"/>
-          </p:nvPr>
-        </p:nvSpPr>
-        <p:spPr/>
-        <p:txBody>
-          <a:bodyPr/>
-          <a:lstStyle/>
-          <a:p>
-            <a:endParaRPr lang="en-US"/>
-          </a:p>
-        </p:txBody>
-      </p:sp>
-      <p:sp>
-        <p:nvSpPr>
-          <p:cNvPr id="4" name="Content Placeholder 3"/>
-          <p:cNvSpPr>
-            <a:spLocks noGrp="1"/>
-          </p:cNvSpPr>
-          <p:nvPr>
-            <p:ph sz="half" idx="2"/>
-          </p:nvPr>
-        </p:nvSpPr>
-        <p:spPr/>
-        <p:txBody>
-          <a:bodyPr/>
-          <a:lstStyle/>
-          <a:p>
-            <a:endParaRPr lang="en-US"/>
-          </a:p>
-        </p:txBody>
-      </p:sp>
+      <p:pic>
+        <p:nvPicPr>
+          <p:cNvPr id="9" name="Picture 8"/>
+          <p:cNvPicPr>
+            <a:picLocks noChangeAspect="1"/>
+          </p:cNvPicPr>
+          <p:nvPr/>
+        </p:nvPicPr>
+        <p:blipFill>
+          <a:blip r:embed="rId2">
+            <a:clrChange>
+              <a:clrFrom>
+                <a:srgbClr val="FFFFFF"/>
+              </a:clrFrom>
+              <a:clrTo>
+                <a:srgbClr val="FFFFFF">
+                  <a:alpha val="0"/>
+                </a:srgbClr>
+              </a:clrTo>
+            </a:clrChange>
+            <a:extLst>
+              <a:ext uri="{28A0092B-C50C-407E-A947-70E740481C1C}">
+                <a14:useLocalDpi xmlns:a14="http://schemas.microsoft.com/office/drawing/2010/main" val="0"/>
+              </a:ext>
+            </a:extLst>
+          </a:blip>
+          <a:stretch>
+            <a:fillRect/>
+          </a:stretch>
+        </p:blipFill>
+        <p:spPr>
+          <a:xfrm>
+            <a:off x="1067142" y="2434535"/>
+            <a:ext cx="3592414" cy="2592000"/>
+          </a:xfrm>
+          <a:prstGeom prst="rect">
+            <a:avLst/>
+          </a:prstGeom>
+        </p:spPr>
+      </p:pic>
+      <p:pic>
+        <p:nvPicPr>
+          <p:cNvPr id="10" name="Picture 9"/>
+          <p:cNvPicPr>
+            <a:picLocks noChangeAspect="1"/>
+          </p:cNvPicPr>
+          <p:nvPr/>
+        </p:nvPicPr>
+        <p:blipFill>
+          <a:blip r:embed="rId3">
+            <a:clrChange>
+              <a:clrFrom>
+                <a:srgbClr val="FFFFFF"/>
+              </a:clrFrom>
+              <a:clrTo>
+                <a:srgbClr val="FFFFFF">
+                  <a:alpha val="0"/>
+                </a:srgbClr>
+              </a:clrTo>
+            </a:clrChange>
+            <a:extLst>
+              <a:ext uri="{28A0092B-C50C-407E-A947-70E740481C1C}">
+                <a14:useLocalDpi xmlns:a14="http://schemas.microsoft.com/office/drawing/2010/main" val="0"/>
+              </a:ext>
+            </a:extLst>
+          </a:blip>
+          <a:stretch>
+            <a:fillRect/>
+          </a:stretch>
+        </p:blipFill>
+        <p:spPr>
+          <a:xfrm>
+            <a:off x="4685400" y="2421283"/>
+            <a:ext cx="3710648" cy="2592000"/>
+          </a:xfrm>
+          <a:prstGeom prst="rect">
+            <a:avLst/>
+          </a:prstGeom>
+        </p:spPr>
+      </p:pic>
+      <p:pic>
+        <p:nvPicPr>
+          <p:cNvPr id="11" name="Picture 10"/>
+          <p:cNvPicPr>
+            <a:picLocks noChangeAspect="1"/>
+          </p:cNvPicPr>
+          <p:nvPr/>
+        </p:nvPicPr>
+        <p:blipFill>
+          <a:blip r:embed="rId4">
+            <a:clrChange>
+              <a:clrFrom>
+                <a:srgbClr val="FFFFFF"/>
+              </a:clrFrom>
+              <a:clrTo>
+                <a:srgbClr val="FFFFFF">
+                  <a:alpha val="0"/>
+                </a:srgbClr>
+              </a:clrTo>
+            </a:clrChange>
+            <a:extLst>
+              <a:ext uri="{28A0092B-C50C-407E-A947-70E740481C1C}">
+                <a14:useLocalDpi xmlns:a14="http://schemas.microsoft.com/office/drawing/2010/main" val="0"/>
+              </a:ext>
+            </a:extLst>
+          </a:blip>
+          <a:stretch>
+            <a:fillRect/>
+          </a:stretch>
+        </p:blipFill>
+        <p:spPr>
+          <a:xfrm>
+            <a:off x="8527909" y="2421283"/>
+            <a:ext cx="3537848" cy="2592000"/>
+          </a:xfrm>
+          <a:prstGeom prst="rect">
+            <a:avLst/>
+          </a:prstGeom>
+        </p:spPr>
+      </p:pic>
     </p:spTree>
     <p:extLst>
       <p:ext uri="{BB962C8B-B14F-4D97-AF65-F5344CB8AC3E}">
-        <p14:creationId xmlns:p14="http://schemas.microsoft.com/office/powerpoint/2010/main" val="1265144232"/>
+        <p14:creationId xmlns:p14="http://schemas.microsoft.com/office/powerpoint/2010/main" val="1289335735"/>
       </p:ext>
     </p:extLst>
   </p:cSld>
@@ -12586,46 +13198,75 @@
           <a:p>
             <a:r>
               <a:rPr lang="en-US" dirty="0" smtClean="0"/>
-              <a:t>Future Investigations</a:t>
-            </a:r>
+              <a:t>How much should you spend?</a:t>
+            </a:r>
+            <a:br>
+              <a:rPr lang="en-US" dirty="0" smtClean="0"/>
+            </a:br>
             <a:endParaRPr lang="en-US" dirty="0"/>
           </a:p>
         </p:txBody>
       </p:sp>
-      <p:sp>
-        <p:nvSpPr>
-          <p:cNvPr id="3" name="Content Placeholder 2"/>
-          <p:cNvSpPr>
-            <a:spLocks noGrp="1"/>
-          </p:cNvSpPr>
-          <p:nvPr>
-            <p:ph sz="half" idx="1"/>
-          </p:nvPr>
-        </p:nvSpPr>
-        <p:spPr/>
+      <p:pic>
+        <p:nvPicPr>
+          <p:cNvPr id="5" name="Picture 4"/>
+          <p:cNvPicPr>
+            <a:picLocks noChangeAspect="1"/>
+          </p:cNvPicPr>
+          <p:nvPr/>
+        </p:nvPicPr>
+        <p:blipFill>
+          <a:blip r:embed="rId3">
+            <a:extLst>
+              <a:ext uri="{28A0092B-C50C-407E-A947-70E740481C1C}">
+                <a14:useLocalDpi xmlns:a14="http://schemas.microsoft.com/office/drawing/2010/main" val="0"/>
+              </a:ext>
+            </a:extLst>
+          </a:blip>
+          <a:stretch>
+            <a:fillRect/>
+          </a:stretch>
+        </p:blipFill>
+        <p:spPr>
+          <a:xfrm>
+            <a:off x="3619500" y="1714500"/>
+            <a:ext cx="4940300" cy="3416300"/>
+          </a:xfrm>
+          <a:prstGeom prst="rect">
+            <a:avLst/>
+          </a:prstGeom>
+        </p:spPr>
+      </p:pic>
+      <p:sp>
+        <p:nvSpPr>
+          <p:cNvPr id="6" name="TextBox 5"/>
+          <p:cNvSpPr txBox="1"/>
+          <p:nvPr/>
+        </p:nvSpPr>
+        <p:spPr>
+          <a:xfrm>
+            <a:off x="5228258" y="5236170"/>
+            <a:ext cx="1722783" cy="923330"/>
+          </a:xfrm>
+          <a:prstGeom prst="rect">
+            <a:avLst/>
+          </a:prstGeom>
+          <a:noFill/>
+        </p:spPr>
         <p:txBody>
-          <a:bodyPr/>
+          <a:bodyPr wrap="square" rtlCol="0">
+            <a:spAutoFit/>
+          </a:bodyPr>
           <a:lstStyle/>
           <a:p>
-            <a:endParaRPr lang="en-US"/>
-          </a:p>
-        </p:txBody>
-      </p:sp>
-      <p:sp>
-        <p:nvSpPr>
-          <p:cNvPr id="4" name="Content Placeholder 3"/>
-          <p:cNvSpPr>
-            <a:spLocks noGrp="1"/>
-          </p:cNvSpPr>
-          <p:nvPr>
-            <p:ph sz="half" idx="2"/>
-          </p:nvPr>
-        </p:nvSpPr>
-        <p:spPr/>
-        <p:txBody>
-          <a:bodyPr/>
-          <a:lstStyle/>
-          <a:p>
+            <a:r>
+              <a:rPr lang="en-US" dirty="0" smtClean="0"/>
+              <a:t>Insert fancier version of </a:t>
+            </a:r>
+            <a:r>
+              <a:rPr lang="en-US" smtClean="0"/>
+              <a:t>this graph</a:t>
+            </a:r>
             <a:endParaRPr lang="en-US"/>
           </a:p>
         </p:txBody>
@@ -12633,7 +13274,7 @@
     </p:spTree>
     <p:extLst>
       <p:ext uri="{BB962C8B-B14F-4D97-AF65-F5344CB8AC3E}">
-        <p14:creationId xmlns:p14="http://schemas.microsoft.com/office/powerpoint/2010/main" val="1952043160"/>
+        <p14:creationId xmlns:p14="http://schemas.microsoft.com/office/powerpoint/2010/main" val="1265144232"/>
       </p:ext>
     </p:extLst>
   </p:cSld>

</xml_diff>